<commit_message>
updated pptx & pdf
</commit_message>
<xml_diff>
--- a/git-beginner.pptx
+++ b/git-beginner.pptx
@@ -233,7 +233,7 @@
           <a:p>
             <a:fld id="{5F24E84A-02C5-45A6-8C43-1C1C9F930287}" type="datetimeFigureOut">
               <a:rPr lang="en-US" smtClean="0"/>
-              <a:t>03/10/12</a:t>
+              <a:t>04/10/12</a:t>
             </a:fld>
             <a:endParaRPr lang="en-US"/>
           </a:p>
@@ -766,7 +766,7 @@
           <a:p>
             <a:fld id="{05E59C73-1A45-482C-83A3-0D30780A159E}" type="datetimeFigureOut">
               <a:rPr lang="en-US" smtClean="0"/>
-              <a:t>03/10/12</a:t>
+              <a:t>04/10/12</a:t>
             </a:fld>
             <a:endParaRPr lang="en-US"/>
           </a:p>
@@ -948,7 +948,7 @@
           <a:p>
             <a:fld id="{05E59C73-1A45-482C-83A3-0D30780A159E}" type="datetimeFigureOut">
               <a:rPr lang="en-US" smtClean="0"/>
-              <a:t>03/10/12</a:t>
+              <a:t>04/10/12</a:t>
             </a:fld>
             <a:endParaRPr lang="en-US"/>
           </a:p>
@@ -1140,7 +1140,7 @@
           <a:p>
             <a:fld id="{05E59C73-1A45-482C-83A3-0D30780A159E}" type="datetimeFigureOut">
               <a:rPr lang="en-US" smtClean="0"/>
-              <a:t>03/10/12</a:t>
+              <a:t>04/10/12</a:t>
             </a:fld>
             <a:endParaRPr lang="en-US"/>
           </a:p>
@@ -1322,7 +1322,7 @@
           <a:p>
             <a:fld id="{05E59C73-1A45-482C-83A3-0D30780A159E}" type="datetimeFigureOut">
               <a:rPr lang="en-US" smtClean="0"/>
-              <a:t>03/10/12</a:t>
+              <a:t>04/10/12</a:t>
             </a:fld>
             <a:endParaRPr lang="en-US"/>
           </a:p>
@@ -1580,7 +1580,7 @@
           <a:p>
             <a:fld id="{05E59C73-1A45-482C-83A3-0D30780A159E}" type="datetimeFigureOut">
               <a:rPr lang="en-US" smtClean="0"/>
-              <a:t>03/10/12</a:t>
+              <a:t>04/10/12</a:t>
             </a:fld>
             <a:endParaRPr lang="en-US"/>
           </a:p>
@@ -1880,7 +1880,7 @@
           <a:p>
             <a:fld id="{05E59C73-1A45-482C-83A3-0D30780A159E}" type="datetimeFigureOut">
               <a:rPr lang="en-US" smtClean="0"/>
-              <a:t>03/10/12</a:t>
+              <a:t>04/10/12</a:t>
             </a:fld>
             <a:endParaRPr lang="en-US"/>
           </a:p>
@@ -2314,7 +2314,7 @@
           <a:p>
             <a:fld id="{05E59C73-1A45-482C-83A3-0D30780A159E}" type="datetimeFigureOut">
               <a:rPr lang="en-US" smtClean="0"/>
-              <a:t>03/10/12</a:t>
+              <a:t>04/10/12</a:t>
             </a:fld>
             <a:endParaRPr lang="en-US"/>
           </a:p>
@@ -2444,7 +2444,7 @@
           <a:p>
             <a:fld id="{05E59C73-1A45-482C-83A3-0D30780A159E}" type="datetimeFigureOut">
               <a:rPr lang="en-US" smtClean="0"/>
-              <a:t>03/10/12</a:t>
+              <a:t>04/10/12</a:t>
             </a:fld>
             <a:endParaRPr lang="en-US"/>
           </a:p>
@@ -2551,7 +2551,7 @@
           <a:p>
             <a:fld id="{05E59C73-1A45-482C-83A3-0D30780A159E}" type="datetimeFigureOut">
               <a:rPr lang="en-US" smtClean="0"/>
-              <a:t>03/10/12</a:t>
+              <a:t>04/10/12</a:t>
             </a:fld>
             <a:endParaRPr lang="en-US"/>
           </a:p>
@@ -2840,7 +2840,7 @@
           <a:p>
             <a:fld id="{05E59C73-1A45-482C-83A3-0D30780A159E}" type="datetimeFigureOut">
               <a:rPr lang="en-US" smtClean="0"/>
-              <a:t>03/10/12</a:t>
+              <a:t>04/10/12</a:t>
             </a:fld>
             <a:endParaRPr lang="en-US"/>
           </a:p>
@@ -3105,7 +3105,7 @@
           <a:p>
             <a:fld id="{05E59C73-1A45-482C-83A3-0D30780A159E}" type="datetimeFigureOut">
               <a:rPr lang="en-US" smtClean="0"/>
-              <a:t>03/10/12</a:t>
+              <a:t>04/10/12</a:t>
             </a:fld>
             <a:endParaRPr lang="en-US"/>
           </a:p>
@@ -3330,7 +3330,7 @@
           <a:p>
             <a:fld id="{05E59C73-1A45-482C-83A3-0D30780A159E}" type="datetimeFigureOut">
               <a:rPr lang="en-US" smtClean="0"/>
-              <a:t>03/10/12</a:t>
+              <a:t>04/10/12</a:t>
             </a:fld>
             <a:endParaRPr lang="en-US"/>
           </a:p>
@@ -3911,15 +3911,7 @@
             </a:pPr>
             <a:r>
               <a:rPr lang="en-US" sz="1600" dirty="0" smtClean="0"/>
-              <a:t>Say, you </a:t>
-            </a:r>
-            <a:r>
-              <a:rPr lang="en-US" sz="1600" dirty="0" smtClean="0"/>
-              <a:t>already hard </a:t>
-            </a:r>
-            <a:r>
-              <a:rPr lang="en-US" sz="1600" dirty="0" smtClean="0"/>
-              <a:t>another file in your repository, named, </a:t>
+              <a:t>Say, you already hard another file in your repository, named, </a:t>
             </a:r>
             <a:r>
               <a:rPr lang="en-US" sz="1600" dirty="0" err="1" smtClean="0">
@@ -4853,15 +4845,7 @@
             </a:pPr>
             <a:r>
               <a:rPr lang="en-US" sz="2000" dirty="0" smtClean="0"/>
-              <a:t>… but </a:t>
-            </a:r>
-            <a:r>
-              <a:rPr lang="en-US" sz="2000" dirty="0" smtClean="0"/>
-              <a:t>in </a:t>
-            </a:r>
-            <a:r>
-              <a:rPr lang="en-US" sz="2000" dirty="0" smtClean="0"/>
-              <a:t>come cases, you just want to add </a:t>
+              <a:t>… but in come cases, you just want to add </a:t>
             </a:r>
             <a:r>
               <a:rPr lang="en-US" sz="2000" i="1" dirty="0" smtClean="0"/>
@@ -5413,11 +5397,7 @@
             </a:r>
             <a:r>
               <a:rPr lang="en-US" dirty="0" smtClean="0"/>
-              <a:t>–-</a:t>
-            </a:r>
-            <a:r>
-              <a:rPr lang="en-US" dirty="0" smtClean="0"/>
-              <a:t>before indexing (staging)</a:t>
+              <a:t>–-before indexing (staging)</a:t>
             </a:r>
             <a:endParaRPr lang="en-US" dirty="0"/>
           </a:p>
@@ -5857,15 +5837,7 @@
             </a:r>
             <a:r>
               <a:rPr lang="en-US" dirty="0" smtClean="0"/>
-              <a:t>--after </a:t>
-            </a:r>
-            <a:r>
-              <a:rPr lang="en-US" dirty="0" smtClean="0"/>
-              <a:t>indexing (staging</a:t>
-            </a:r>
-            <a:r>
-              <a:rPr lang="en-US" dirty="0" smtClean="0"/>
-              <a:t>)</a:t>
+              <a:t>--after indexing (staging)</a:t>
             </a:r>
             <a:endParaRPr lang="en-US" dirty="0"/>
           </a:p>
@@ -6334,11 +6306,7 @@
             </a:r>
             <a:r>
               <a:rPr lang="en-US" dirty="0" smtClean="0"/>
-              <a:t> the short/clean </a:t>
-            </a:r>
-            <a:r>
-              <a:rPr lang="en-US" dirty="0" smtClean="0"/>
-              <a:t>way</a:t>
+              <a:t> the short/clean way</a:t>
             </a:r>
             <a:endParaRPr lang="en-US" sz="1600" dirty="0"/>
           </a:p>
@@ -8835,17 +8803,8 @@
             </a:pPr>
             <a:r>
               <a:rPr lang="en-US" dirty="0" smtClean="0"/>
-              <a:t>Fill </a:t>
-            </a:r>
-            <a:r>
-              <a:rPr lang="en-US" dirty="0" smtClean="0"/>
-              <a:t>in </a:t>
-            </a:r>
-            <a:r>
-              <a:rPr lang="en-US" dirty="0" smtClean="0"/>
-              <a:t>information.</a:t>
-            </a:r>
-            <a:endParaRPr lang="en-US" dirty="0" smtClean="0"/>
+              <a:t>Fill in information.</a:t>
+            </a:r>
           </a:p>
           <a:p>
             <a:pPr marL="342900" indent="-342900">
@@ -8915,15 +8874,7 @@
             </a:pPr>
             <a:r>
               <a:rPr lang="en-US" dirty="0" smtClean="0"/>
-              <a:t>In your </a:t>
-            </a:r>
-            <a:r>
-              <a:rPr lang="en-US" dirty="0" smtClean="0"/>
-              <a:t>terminal/command prompt/whatever</a:t>
-            </a:r>
-            <a:r>
-              <a:rPr lang="en-US" dirty="0" smtClean="0"/>
-              <a:t>. Type in, with</a:t>
+              <a:t>In your terminal/command prompt/whatever. Type in, with</a:t>
             </a:r>
             <a:r>
               <a:rPr lang="en-US" dirty="0" smtClean="0">
@@ -8957,11 +8908,7 @@
             </a:pPr>
             <a:r>
               <a:rPr lang="en-US" dirty="0" smtClean="0"/>
-              <a:t>Let me </a:t>
-            </a:r>
-            <a:r>
-              <a:rPr lang="en-US" dirty="0" smtClean="0"/>
-              <a:t>check</a:t>
+              <a:t>Let me check</a:t>
             </a:r>
           </a:p>
           <a:p>
@@ -9973,11 +9920,7 @@
             </a:r>
             <a:r>
               <a:rPr lang="en-US" dirty="0" smtClean="0"/>
-              <a:t>t’s </a:t>
-            </a:r>
-            <a:r>
-              <a:rPr lang="en-US" dirty="0" smtClean="0"/>
-              <a:t>recommended to run </a:t>
+              <a:t>t’s recommended to run </a:t>
             </a:r>
             <a:r>
               <a:rPr lang="en-US" dirty="0" err="1" smtClean="0">
@@ -10715,11 +10658,7 @@
             </a:r>
             <a:r>
               <a:rPr lang="en-US" sz="1400" dirty="0" smtClean="0"/>
-              <a:t>n </a:t>
-            </a:r>
-            <a:r>
-              <a:rPr lang="en-US" sz="1400" dirty="0" smtClean="0"/>
-              <a:t>order to check and see more information for what we have done in recent activities. You can run this:</a:t>
+              <a:t>n order to check and see more information for what we have done in recent activities. You can run this:</a:t>
             </a:r>
             <a:endParaRPr lang="en-US" sz="1400" dirty="0"/>
           </a:p>
@@ -11093,11 +11032,7 @@
             </a:r>
             <a:r>
               <a:rPr lang="en-US" sz="1200" dirty="0" smtClean="0"/>
-              <a:t> </a:t>
-            </a:r>
-            <a:r>
-              <a:rPr lang="en-US" sz="1200" dirty="0" smtClean="0"/>
-              <a:t>command.</a:t>
+              <a:t> command.</a:t>
             </a:r>
           </a:p>
           <a:p>
@@ -11107,11 +11042,7 @@
             </a:pPr>
             <a:r>
               <a:rPr lang="en-US" sz="1200" dirty="0" smtClean="0"/>
-              <a:t>What </a:t>
-            </a:r>
-            <a:r>
-              <a:rPr lang="en-US" sz="1200" dirty="0" smtClean="0"/>
-              <a:t>does </a:t>
+              <a:t>What does </a:t>
             </a:r>
             <a:r>
               <a:rPr lang="en-US" sz="1200" dirty="0" smtClean="0">
@@ -11121,15 +11052,7 @@
             </a:r>
             <a:r>
               <a:rPr lang="en-US" sz="1200" dirty="0" smtClean="0"/>
-              <a:t> mean, it’s simply your current branch/ last </a:t>
-            </a:r>
-            <a:r>
-              <a:rPr lang="en-US" sz="1200" dirty="0" smtClean="0"/>
-              <a:t>committed </a:t>
-            </a:r>
-            <a:r>
-              <a:rPr lang="en-US" sz="1200" dirty="0" smtClean="0"/>
-              <a:t>stage. (Don’t confuse with </a:t>
+              <a:t> mean, it’s simply your current branch/ last committed stage. (Don’t confuse with </a:t>
             </a:r>
             <a:r>
               <a:rPr lang="en-US" sz="1200" dirty="0" smtClean="0">
@@ -11202,15 +11125,7 @@
             </a:pPr>
             <a:r>
               <a:rPr lang="en-US" sz="1200" dirty="0" smtClean="0"/>
-              <a:t>Now you have </a:t>
-            </a:r>
-            <a:r>
-              <a:rPr lang="en-US" sz="1200" dirty="0" smtClean="0"/>
-              <a:t>information </a:t>
-            </a:r>
-            <a:r>
-              <a:rPr lang="en-US" sz="1200" dirty="0" smtClean="0"/>
-              <a:t>about your </a:t>
+              <a:t>Now you have information about your </a:t>
             </a:r>
             <a:r>
               <a:rPr lang="en-US" sz="1200" dirty="0" smtClean="0">
@@ -13351,25 +13266,7 @@
                 </a:solidFill>
                 <a:latin typeface="Source Code Pro" pitchFamily="49" charset="0"/>
               </a:rPr>
-              <a:t># </a:t>
-            </a:r>
-            <a:r>
-              <a:rPr lang="en-US" sz="1550" b="1" dirty="0" smtClean="0">
-                <a:solidFill>
-                  <a:srgbClr val="53777A"/>
-                </a:solidFill>
-                <a:latin typeface="Source Code Pro" pitchFamily="49" charset="0"/>
-              </a:rPr>
-              <a:t>BASIC COMMAND </a:t>
-            </a:r>
-            <a:r>
-              <a:rPr lang="en-US" sz="1550" b="1" dirty="0" smtClean="0">
-                <a:solidFill>
-                  <a:srgbClr val="53777A"/>
-                </a:solidFill>
-                <a:latin typeface="Source Code Pro" pitchFamily="49" charset="0"/>
-              </a:rPr>
-              <a:t>…</a:t>
+              <a:t># BASIC COMMAND …</a:t>
             </a:r>
           </a:p>
           <a:p>
@@ -13645,25 +13542,7 @@
                 </a:solidFill>
                 <a:latin typeface="Source Code Pro" pitchFamily="49" charset="0"/>
               </a:rPr>
-              <a:t># show file added to staging </a:t>
-            </a:r>
-            <a:r>
-              <a:rPr lang="en-US" sz="1550" b="1" dirty="0" smtClean="0">
-                <a:solidFill>
-                  <a:srgbClr val="53777A"/>
-                </a:solidFill>
-                <a:latin typeface="Source Code Pro" pitchFamily="49" charset="0"/>
-              </a:rPr>
-              <a:t>area, </a:t>
-            </a:r>
-            <a:r>
-              <a:rPr lang="en-US" sz="1550" b="1" dirty="0" smtClean="0">
-                <a:solidFill>
-                  <a:srgbClr val="53777A"/>
-                </a:solidFill>
-                <a:latin typeface="Source Code Pro" pitchFamily="49" charset="0"/>
-              </a:rPr>
-              <a:t>files with changes, untracked files</a:t>
+              <a:t># show file added to staging area, files with changes, untracked files</a:t>
             </a:r>
           </a:p>
           <a:p>
@@ -14548,8 +14427,13 @@
                 </a:solidFill>
                 <a:latin typeface="Source Code Pro" pitchFamily="49" charset="0"/>
               </a:rPr>
-              <a:t># </a:t>
-            </a:r>
+              <a:t># EVEN MORE COMMAND …</a:t>
+            </a:r>
+          </a:p>
+          <a:p>
+            <a:pPr marL="0" indent="0">
+              <a:buNone/>
+            </a:pPr>
             <a:r>
               <a:rPr lang="en-US" sz="1600" b="1" dirty="0" smtClean="0">
                 <a:solidFill>
@@ -14557,7 +14441,16 @@
                 </a:solidFill>
                 <a:latin typeface="Source Code Pro" pitchFamily="49" charset="0"/>
               </a:rPr>
-              <a:t>EVEN </a:t>
+              <a:t>## </a:t>
+            </a:r>
+            <a:r>
+              <a:rPr lang="en-US" sz="1600" b="1" dirty="0">
+                <a:solidFill>
+                  <a:srgbClr val="53777A"/>
+                </a:solidFill>
+                <a:latin typeface="Source Code Pro" pitchFamily="49" charset="0"/>
+              </a:rPr>
+              <a:t>note: HEAD === </a:t>
             </a:r>
             <a:r>
               <a:rPr lang="en-US" sz="1600" b="1" dirty="0" smtClean="0">
@@ -14566,66 +14459,7 @@
                 </a:solidFill>
                 <a:latin typeface="Source Code Pro" pitchFamily="49" charset="0"/>
               </a:rPr>
-              <a:t>MORE </a:t>
-            </a:r>
-            <a:r>
-              <a:rPr lang="en-US" sz="1600" b="1" dirty="0" smtClean="0">
-                <a:solidFill>
-                  <a:srgbClr val="53777A"/>
-                </a:solidFill>
-                <a:latin typeface="Source Code Pro" pitchFamily="49" charset="0"/>
-              </a:rPr>
-              <a:t>COMMAND </a:t>
-            </a:r>
-            <a:r>
-              <a:rPr lang="en-US" sz="1600" b="1" dirty="0" smtClean="0">
-                <a:solidFill>
-                  <a:srgbClr val="53777A"/>
-                </a:solidFill>
-                <a:latin typeface="Source Code Pro" pitchFamily="49" charset="0"/>
-              </a:rPr>
-              <a:t>…</a:t>
-            </a:r>
-          </a:p>
-          <a:p>
-            <a:pPr marL="0" indent="0">
-              <a:buNone/>
-            </a:pPr>
-            <a:r>
-              <a:rPr lang="en-US" sz="1600" b="1" dirty="0" smtClean="0">
-                <a:solidFill>
-                  <a:srgbClr val="53777A"/>
-                </a:solidFill>
-                <a:latin typeface="Source Code Pro" pitchFamily="49" charset="0"/>
-              </a:rPr>
-              <a:t>## </a:t>
-            </a:r>
-            <a:r>
-              <a:rPr lang="en-US" sz="1600" b="1" dirty="0">
-                <a:solidFill>
-                  <a:srgbClr val="53777A"/>
-                </a:solidFill>
-                <a:latin typeface="Source Code Pro" pitchFamily="49" charset="0"/>
-              </a:rPr>
-              <a:t>note: HEAD === </a:t>
-            </a:r>
-            <a:r>
-              <a:rPr lang="en-US" sz="1600" b="1" dirty="0" smtClean="0">
-                <a:solidFill>
-                  <a:srgbClr val="53777A"/>
-                </a:solidFill>
-                <a:latin typeface="Source Code Pro" pitchFamily="49" charset="0"/>
-              </a:rPr>
-              <a:t>most recent </a:t>
-            </a:r>
-            <a:r>
-              <a:rPr lang="en-US" sz="1600" b="1" dirty="0" smtClean="0">
-                <a:solidFill>
-                  <a:srgbClr val="53777A"/>
-                </a:solidFill>
-                <a:latin typeface="Source Code Pro" pitchFamily="49" charset="0"/>
-              </a:rPr>
-              <a:t>commit on your working branch. As I said before, default is master.</a:t>
+              <a:t>most recent commit on your working branch. As I said before, default is master.</a:t>
             </a:r>
             <a:endParaRPr lang="en-US" sz="1600" b="1" dirty="0">
               <a:solidFill>
@@ -15057,23 +14891,8 @@
                 </a:solidFill>
                 <a:latin typeface="Source Code Pro" pitchFamily="49" charset="0"/>
               </a:rPr>
-              <a:t>### </a:t>
-            </a:r>
-            <a:r>
-              <a:rPr lang="en-US" sz="1600" b="1" dirty="0" smtClean="0">
-                <a:solidFill>
-                  <a:srgbClr val="53777A"/>
-                </a:solidFill>
-                <a:latin typeface="Source Code Pro" pitchFamily="49" charset="0"/>
-              </a:rPr>
-              <a:t>branching</a:t>
-            </a:r>
-            <a:endParaRPr lang="en-US" sz="1600" b="1" dirty="0" smtClean="0">
-              <a:solidFill>
-                <a:srgbClr val="53777A"/>
-              </a:solidFill>
-              <a:latin typeface="Source Code Pro" pitchFamily="49" charset="0"/>
-            </a:endParaRPr>
+              <a:t>### branching</a:t>
+            </a:r>
           </a:p>
           <a:p>
             <a:pPr marL="0" indent="0">
@@ -18399,7 +18218,7 @@
         <p:spPr/>
         <p:txBody>
           <a:bodyPr>
-            <a:normAutofit/>
+            <a:noAutofit/>
           </a:bodyPr>
           <a:lstStyle/>
           <a:p>
@@ -18407,71 +18226,249 @@
               <a:buNone/>
             </a:pPr>
             <a:r>
-              <a:rPr lang="en-US" sz="3200" smtClean="0"/>
-              <a:t>Installing git in your dev machine</a:t>
+              <a:rPr lang="en-US" sz="1800" dirty="0" smtClean="0"/>
+              <a:t>Installing </a:t>
+            </a:r>
+            <a:r>
+              <a:rPr lang="en-US" sz="1800" dirty="0" err="1" smtClean="0"/>
+              <a:t>git</a:t>
+            </a:r>
+            <a:r>
+              <a:rPr lang="en-US" sz="1800" dirty="0" smtClean="0"/>
+              <a:t> in your </a:t>
+            </a:r>
+            <a:r>
+              <a:rPr lang="en-US" sz="1800" dirty="0" smtClean="0"/>
+              <a:t>development </a:t>
+            </a:r>
+            <a:r>
+              <a:rPr lang="en-US" sz="1800" dirty="0" smtClean="0"/>
+              <a:t>machine</a:t>
             </a:r>
           </a:p>
           <a:p>
             <a:pPr marL="400050" lvl="1" indent="0">
               <a:buNone/>
             </a:pPr>
-            <a:endParaRPr lang="en-US" sz="3200" smtClean="0"/>
+            <a:r>
+              <a:rPr lang="en-US" sz="2000" dirty="0" smtClean="0">
+                <a:latin typeface="+mj-lt"/>
+              </a:rPr>
+              <a:t>MAC</a:t>
+            </a:r>
+            <a:r>
+              <a:rPr lang="en-US" sz="2000" dirty="0" smtClean="0"/>
+              <a:t>: </a:t>
+            </a:r>
+            <a:endParaRPr lang="en-US" sz="2000" dirty="0" smtClean="0"/>
+          </a:p>
+          <a:p>
+            <a:pPr lvl="1" indent="-342900"/>
+            <a:r>
+              <a:rPr lang="en-US" sz="1600" dirty="0" smtClean="0">
+                <a:hlinkClick r:id="rId2"/>
+              </a:rPr>
+              <a:t>http://</a:t>
+            </a:r>
+            <a:r>
+              <a:rPr lang="en-US" sz="1600" dirty="0" err="1" smtClean="0">
+                <a:hlinkClick r:id="rId2"/>
+              </a:rPr>
+              <a:t>code.google.com</a:t>
+            </a:r>
+            <a:r>
+              <a:rPr lang="en-US" sz="1600" dirty="0" smtClean="0">
+                <a:hlinkClick r:id="rId2"/>
+              </a:rPr>
+              <a:t>/p/</a:t>
+            </a:r>
+            <a:r>
+              <a:rPr lang="en-US" sz="1600" dirty="0" err="1" smtClean="0">
+                <a:hlinkClick r:id="rId2"/>
+              </a:rPr>
+              <a:t>git</a:t>
+            </a:r>
+            <a:r>
+              <a:rPr lang="en-US" sz="1600" dirty="0" smtClean="0">
+                <a:hlinkClick r:id="rId2"/>
+              </a:rPr>
+              <a:t>-</a:t>
+            </a:r>
+            <a:r>
+              <a:rPr lang="en-US" sz="1600" dirty="0" err="1" smtClean="0">
+                <a:hlinkClick r:id="rId2"/>
+              </a:rPr>
+              <a:t>osx</a:t>
+            </a:r>
+            <a:r>
+              <a:rPr lang="en-US" sz="1600" dirty="0" smtClean="0">
+                <a:hlinkClick r:id="rId2"/>
+              </a:rPr>
+              <a:t>-installer</a:t>
+            </a:r>
+            <a:endParaRPr lang="en-US" sz="1600" dirty="0" smtClean="0"/>
+          </a:p>
+          <a:p>
+            <a:pPr lvl="1" indent="-342900"/>
+            <a:r>
+              <a:rPr lang="en-US" sz="1600" dirty="0"/>
+              <a:t>http://</a:t>
+            </a:r>
+            <a:r>
+              <a:rPr lang="en-US" sz="1600" dirty="0" err="1"/>
+              <a:t>mac.github.com</a:t>
+            </a:r>
+            <a:r>
+              <a:rPr lang="en-US" sz="1600" dirty="0" smtClean="0"/>
+              <a:t>/</a:t>
+            </a:r>
+            <a:endParaRPr lang="en-US" sz="1600" dirty="0"/>
           </a:p>
           <a:p>
             <a:pPr marL="400050" lvl="1" indent="0">
               <a:buNone/>
             </a:pPr>
             <a:r>
-              <a:rPr lang="en-US" sz="3200" smtClean="0">
+              <a:rPr lang="en-US" sz="2000" dirty="0" smtClean="0">
                 <a:latin typeface="+mj-lt"/>
               </a:rPr>
-              <a:t>MAC</a:t>
-            </a:r>
-            <a:r>
-              <a:rPr lang="en-US" sz="3200" smtClean="0"/>
+              <a:t>Windows</a:t>
+            </a:r>
+            <a:r>
+              <a:rPr lang="en-US" sz="1600" dirty="0" smtClean="0"/>
               <a:t>: </a:t>
             </a:r>
-            <a:r>
-              <a:rPr lang="en-US" sz="2400" smtClean="0">
-                <a:hlinkClick r:id="rId2"/>
-              </a:rPr>
-              <a:t>http://code.google.com/p/git-osx-installer</a:t>
-            </a:r>
-            <a:endParaRPr lang="en-US" sz="2400" smtClean="0"/>
+            <a:endParaRPr lang="en-US" sz="1600" dirty="0" smtClean="0"/>
+          </a:p>
+          <a:p>
+            <a:pPr lvl="1" indent="-342900"/>
+            <a:r>
+              <a:rPr lang="en-US" sz="1600" dirty="0" smtClean="0">
+                <a:hlinkClick r:id="rId3"/>
+              </a:rPr>
+              <a:t>http</a:t>
+            </a:r>
+            <a:r>
+              <a:rPr lang="en-US" sz="1600" dirty="0" smtClean="0">
+                <a:hlinkClick r:id="rId3"/>
+              </a:rPr>
+              <a:t>://</a:t>
+            </a:r>
+            <a:r>
+              <a:rPr lang="en-US" sz="1600" dirty="0" err="1" smtClean="0">
+                <a:hlinkClick r:id="rId3"/>
+              </a:rPr>
+              <a:t>code.google.com</a:t>
+            </a:r>
+            <a:r>
+              <a:rPr lang="en-US" sz="1600" dirty="0" smtClean="0">
+                <a:hlinkClick r:id="rId3"/>
+              </a:rPr>
+              <a:t>/p/</a:t>
+            </a:r>
+            <a:r>
+              <a:rPr lang="en-US" sz="1600" dirty="0" err="1" smtClean="0">
+                <a:hlinkClick r:id="rId3"/>
+              </a:rPr>
+              <a:t>msysgit</a:t>
+            </a:r>
+            <a:endParaRPr lang="en-US" sz="1600" dirty="0" smtClean="0"/>
+          </a:p>
+          <a:p>
+            <a:pPr lvl="1" indent="-342900"/>
+            <a:r>
+              <a:rPr lang="en-US" sz="1600" dirty="0" smtClean="0">
+                <a:hlinkClick r:id="rId4"/>
+              </a:rPr>
+              <a:t>http</a:t>
+            </a:r>
+            <a:r>
+              <a:rPr lang="en-US" sz="1600" dirty="0">
+                <a:hlinkClick r:id="rId4"/>
+              </a:rPr>
+              <a:t>://</a:t>
+            </a:r>
+            <a:r>
+              <a:rPr lang="en-US" sz="1600" dirty="0" err="1">
+                <a:hlinkClick r:id="rId4"/>
+              </a:rPr>
+              <a:t>windows.github.com</a:t>
+            </a:r>
+            <a:r>
+              <a:rPr lang="en-US" sz="1600" dirty="0" smtClean="0">
+                <a:hlinkClick r:id="rId4"/>
+              </a:rPr>
+              <a:t>/</a:t>
+            </a:r>
+            <a:r>
+              <a:rPr lang="en-US" sz="1600" dirty="0" smtClean="0"/>
+              <a:t> </a:t>
+            </a:r>
+            <a:r>
+              <a:rPr lang="en-US" sz="1600" smtClean="0"/>
+              <a:t>&lt;- highly recommended!</a:t>
+            </a:r>
+            <a:endParaRPr lang="en-US" sz="1600" dirty="0" smtClean="0"/>
           </a:p>
           <a:p>
             <a:pPr marL="400050" lvl="1" indent="0">
               <a:buNone/>
             </a:pPr>
-            <a:endParaRPr lang="en-US" sz="2400"/>
+            <a:r>
+              <a:rPr lang="en-US" sz="1600" dirty="0" smtClean="0">
+                <a:latin typeface="+mj-lt"/>
+              </a:rPr>
+              <a:t>Eclipse plugins:</a:t>
+            </a:r>
+          </a:p>
+          <a:p>
+            <a:pPr marL="685800" lvl="1"/>
+            <a:r>
+              <a:rPr lang="en-US" sz="1600" dirty="0">
+                <a:hlinkClick r:id="rId5"/>
+              </a:rPr>
+              <a:t>http://</a:t>
+            </a:r>
+            <a:r>
+              <a:rPr lang="en-US" sz="1600" dirty="0" err="1">
+                <a:hlinkClick r:id="rId5"/>
+              </a:rPr>
+              <a:t>eclipse.github.com</a:t>
+            </a:r>
+            <a:r>
+              <a:rPr lang="en-US" sz="1600" dirty="0" smtClean="0">
+                <a:hlinkClick r:id="rId5"/>
+              </a:rPr>
+              <a:t>/</a:t>
+            </a:r>
+            <a:endParaRPr lang="en-US" sz="1600" dirty="0" smtClean="0"/>
           </a:p>
           <a:p>
             <a:pPr marL="400050" lvl="1" indent="0">
               <a:buNone/>
             </a:pPr>
             <a:r>
-              <a:rPr lang="en-US" sz="3200" smtClean="0">
+              <a:rPr lang="en-US" sz="1600" dirty="0" smtClean="0">
                 <a:latin typeface="+mj-lt"/>
               </a:rPr>
-              <a:t>Windows</a:t>
-            </a:r>
-            <a:r>
-              <a:rPr lang="en-US" sz="2400" smtClean="0"/>
-              <a:t>: </a:t>
-            </a:r>
-            <a:r>
-              <a:rPr lang="en-US" sz="2400" smtClean="0">
-                <a:hlinkClick r:id="rId3"/>
-              </a:rPr>
-              <a:t>http://code.google.com/p/msysgit</a:t>
-            </a:r>
-            <a:endParaRPr lang="en-US" sz="2400" smtClean="0"/>
-          </a:p>
-          <a:p>
-            <a:pPr marL="400050" lvl="1" indent="0">
-              <a:buNone/>
-            </a:pPr>
-            <a:endParaRPr lang="en-US" sz="2400"/>
+              <a:t>Mobile:</a:t>
+            </a:r>
+          </a:p>
+          <a:p>
+            <a:pPr marL="685800" lvl="1"/>
+            <a:r>
+              <a:rPr lang="en-US" sz="1600" dirty="0"/>
+              <a:t>http://</a:t>
+            </a:r>
+            <a:r>
+              <a:rPr lang="en-US" sz="1600" dirty="0" err="1"/>
+              <a:t>mobile.github.com</a:t>
+            </a:r>
+            <a:r>
+              <a:rPr lang="en-US" sz="1600" dirty="0" smtClean="0"/>
+              <a:t>/</a:t>
+            </a:r>
+            <a:endParaRPr lang="en-US" sz="1600" dirty="0" smtClean="0"/>
           </a:p>
         </p:txBody>
       </p:sp>
@@ -18763,13 +18760,7 @@
               <a:rPr lang="en-US" sz="3200" smtClean="0">
                 <a:latin typeface="+mj-lt"/>
               </a:rPr>
-              <a:t>Well</a:t>
-            </a:r>
-            <a:r>
-              <a:rPr lang="en-US" sz="3200" smtClean="0">
-                <a:latin typeface="+mj-lt"/>
-              </a:rPr>
-              <a:t>, that’s it! </a:t>
+              <a:t>Well, that’s it! </a:t>
             </a:r>
           </a:p>
           <a:p>

</xml_diff>